<commit_message>
names with td prefix
</commit_message>
<xml_diff>
--- a/market/tdRPA架构.pptx
+++ b/market/tdRPA架构.pptx
@@ -3306,8 +3306,16 @@
           <a:p>
             <a:pPr algn="ctr"/>
             <a:r>
+              <a:rPr lang="en-US" altLang="zh-CN" dirty="0" err="1"/>
+              <a:t>tdSelector</a:t>
+            </a:r>
+            <a:r>
+              <a:rPr lang="en-US" altLang="zh-CN" dirty="0"/>
+              <a:t> </a:t>
+            </a:r>
+            <a:r>
               <a:rPr lang="en-US" altLang="zh-CN" dirty="0" smtClean="0"/>
-              <a:t>Selector - UI</a:t>
+              <a:t>- UI</a:t>
             </a:r>
             <a:r>
               <a:rPr lang="zh-CN" altLang="en-US" dirty="0" smtClean="0"/>
@@ -3354,8 +3362,16 @@
           <a:p>
             <a:pPr algn="ctr"/>
             <a:r>
+              <a:rPr lang="en-US" altLang="zh-CN" dirty="0" err="1"/>
+              <a:t>tdLocator</a:t>
+            </a:r>
+            <a:r>
+              <a:rPr lang="en-US" altLang="zh-CN" dirty="0"/>
+              <a:t> </a:t>
+            </a:r>
+            <a:r>
               <a:rPr lang="en-US" altLang="zh-CN" dirty="0" smtClean="0"/>
-              <a:t>Locator - UI</a:t>
+              <a:t>- UI</a:t>
             </a:r>
             <a:r>
               <a:rPr lang="zh-CN" altLang="en-US" dirty="0" smtClean="0"/>
@@ -3405,9 +3421,10 @@
           <a:p>
             <a:pPr algn="ctr"/>
             <a:r>
-              <a:rPr lang="en-US" altLang="zh-CN" dirty="0" smtClean="0"/>
-              <a:t>Worker</a:t>
-            </a:r>
+              <a:rPr lang="en-US" altLang="zh-CN" dirty="0" err="1"/>
+              <a:t>tdWorker</a:t>
+            </a:r>
+            <a:endParaRPr lang="en-US" altLang="zh-CN" dirty="0" smtClean="0"/>
           </a:p>
           <a:p>
             <a:pPr algn="ctr"/>
@@ -3506,8 +3523,8 @@
           <a:p>
             <a:pPr algn="ctr"/>
             <a:r>
-              <a:rPr lang="en-US" altLang="zh-CN" dirty="0" smtClean="0"/>
-              <a:t>Power</a:t>
+              <a:rPr lang="en-US" altLang="zh-CN" dirty="0" err="1"/>
+              <a:t>tdPower</a:t>
             </a:r>
             <a:endParaRPr lang="en-US" altLang="zh-CN" dirty="0" smtClean="0"/>
           </a:p>

</xml_diff>